<commit_message>
removing .DS_Store and updating tutorial
</commit_message>
<xml_diff>
--- a/node_tutorial.pptx
+++ b/node_tutorial.pptx
@@ -10512,7 +10512,7 @@
         <p:spPr/>
         <p:txBody>
           <a:bodyPr>
-            <a:normAutofit fontScale="92500" lnSpcReduction="10000"/>
+            <a:normAutofit fontScale="92500"/>
           </a:bodyPr>
           <a:lstStyle/>
           <a:p>
@@ -10525,16 +10525,13 @@
             <a:pPr lvl="1"/>
             <a:r>
               <a:rPr lang="en-US" dirty="0" smtClean="0"/>
-              <a:t>write: write to a stream</a:t>
-            </a:r>
-            <a:endParaRPr lang="en-US" dirty="0"/>
-          </a:p>
-          <a:p>
-            <a:pPr lvl="1"/>
+              <a:t>write: write to a </a:t>
+            </a:r>
             <a:r>
               <a:rPr lang="en-US" dirty="0" smtClean="0"/>
-              <a:t>resume: resume a paused stream</a:t>
-            </a:r>
+              <a:t>stream</a:t>
+            </a:r>
+            <a:endParaRPr lang="en-US" dirty="0" smtClean="0"/>
           </a:p>
           <a:p>
             <a:pPr lvl="1"/>
@@ -10543,8 +10540,8 @@
               <a:t>end: terminate the </a:t>
             </a:r>
             <a:r>
-              <a:rPr lang="en-US" dirty="0" err="1" smtClean="0"/>
-              <a:t>streasm</a:t>
+              <a:rPr lang="en-US" dirty="0" smtClean="0"/>
+              <a:t>stream</a:t>
             </a:r>
             <a:endParaRPr lang="en-US" dirty="0" smtClean="0"/>
           </a:p>
@@ -15475,6 +15472,13 @@
   <p:clrMapOvr>
     <a:masterClrMapping/>
   </p:clrMapOvr>
+  <p:timing>
+    <p:tnLst>
+      <p:par>
+        <p:cTn xmlns:p14="http://schemas.microsoft.com/office/powerpoint/2010/main" id="1" dur="indefinite" restart="never" nodeType="tmRoot"/>
+      </p:par>
+    </p:tnLst>
+  </p:timing>
 </p:sld>
 </file>
 
@@ -15733,6 +15737,13 @@
   <p:clrMapOvr>
     <a:masterClrMapping/>
   </p:clrMapOvr>
+  <p:timing>
+    <p:tnLst>
+      <p:par>
+        <p:cTn xmlns:p14="http://schemas.microsoft.com/office/powerpoint/2010/main" id="1" dur="indefinite" restart="never" nodeType="tmRoot"/>
+      </p:par>
+    </p:tnLst>
+  </p:timing>
 </p:sld>
 </file>
 
@@ -15843,6 +15854,13 @@
   <p:clrMapOvr>
     <a:masterClrMapping/>
   </p:clrMapOvr>
+  <p:timing>
+    <p:tnLst>
+      <p:par>
+        <p:cTn xmlns:p14="http://schemas.microsoft.com/office/powerpoint/2010/main" id="1" dur="indefinite" restart="never" nodeType="tmRoot"/>
+      </p:par>
+    </p:tnLst>
+  </p:timing>
 </p:sld>
 </file>
 
@@ -15997,6 +16015,13 @@
   <p:clrMapOvr>
     <a:masterClrMapping/>
   </p:clrMapOvr>
+  <p:timing>
+    <p:tnLst>
+      <p:par>
+        <p:cTn xmlns:p14="http://schemas.microsoft.com/office/powerpoint/2010/main" id="1" dur="indefinite" restart="never" nodeType="tmRoot"/>
+      </p:par>
+    </p:tnLst>
+  </p:timing>
 </p:sld>
 </file>
 
@@ -16194,6 +16219,13 @@
   <p:clrMapOvr>
     <a:masterClrMapping/>
   </p:clrMapOvr>
+  <p:timing>
+    <p:tnLst>
+      <p:par>
+        <p:cTn xmlns:p14="http://schemas.microsoft.com/office/powerpoint/2010/main" id="1" dur="indefinite" restart="never" nodeType="tmRoot"/>
+      </p:par>
+    </p:tnLst>
+  </p:timing>
 </p:sld>
 </file>
 
@@ -16310,6 +16342,13 @@
   <p:clrMapOvr>
     <a:masterClrMapping/>
   </p:clrMapOvr>
+  <p:timing>
+    <p:tnLst>
+      <p:par>
+        <p:cTn xmlns:p14="http://schemas.microsoft.com/office/powerpoint/2010/main" id="1" dur="indefinite" restart="never" nodeType="tmRoot"/>
+      </p:par>
+    </p:tnLst>
+  </p:timing>
 </p:sld>
 </file>
 
@@ -16404,6 +16443,13 @@
   <p:clrMapOvr>
     <a:masterClrMapping/>
   </p:clrMapOvr>
+  <p:timing>
+    <p:tnLst>
+      <p:par>
+        <p:cTn xmlns:p14="http://schemas.microsoft.com/office/powerpoint/2010/main" id="1" dur="indefinite" restart="never" nodeType="tmRoot"/>
+      </p:par>
+    </p:tnLst>
+  </p:timing>
 </p:sld>
 </file>
 
@@ -16967,6 +17013,13 @@
   <p:clrMapOvr>
     <a:masterClrMapping/>
   </p:clrMapOvr>
+  <p:timing>
+    <p:tnLst>
+      <p:par>
+        <p:cTn xmlns:p14="http://schemas.microsoft.com/office/powerpoint/2010/main" id="1" dur="indefinite" restart="never" nodeType="tmRoot"/>
+      </p:par>
+    </p:tnLst>
+  </p:timing>
 </p:sld>
 </file>
 
@@ -17280,6 +17333,13 @@
   <p:clrMapOvr>
     <a:masterClrMapping/>
   </p:clrMapOvr>
+  <p:timing>
+    <p:tnLst>
+      <p:par>
+        <p:cTn xmlns:p14="http://schemas.microsoft.com/office/powerpoint/2010/main" id="1" dur="indefinite" restart="never" nodeType="tmRoot"/>
+      </p:par>
+    </p:tnLst>
+  </p:timing>
 </p:sld>
 </file>
 
@@ -17511,6 +17571,13 @@
   <p:clrMapOvr>
     <a:masterClrMapping/>
   </p:clrMapOvr>
+  <p:timing>
+    <p:tnLst>
+      <p:par>
+        <p:cTn xmlns:p14="http://schemas.microsoft.com/office/powerpoint/2010/main" id="1" dur="indefinite" restart="never" nodeType="tmRoot"/>
+      </p:par>
+    </p:tnLst>
+  </p:timing>
 </p:sld>
 </file>
 
@@ -18326,13 +18393,8 @@
             </a:r>
             <a:r>
               <a:rPr lang="en-US" dirty="0" smtClean="0"/>
-              <a:t> install </a:t>
-            </a:r>
-            <a:r>
-              <a:rPr lang="en-US" dirty="0" smtClean="0"/>
-              <a:t>express</a:t>
-            </a:r>
-            <a:endParaRPr lang="en-US" dirty="0" smtClean="0"/>
+              <a:t> install express</a:t>
+            </a:r>
           </a:p>
           <a:p>
             <a:r>
@@ -18363,11 +18425,7 @@
           <a:p>
             <a:r>
               <a:rPr lang="en-US" dirty="0" smtClean="0"/>
-              <a:t>Powerful </a:t>
-            </a:r>
-            <a:r>
-              <a:rPr lang="en-US" dirty="0" smtClean="0"/>
-              <a:t>Sinatra inspired web framework</a:t>
+              <a:t>Powerful Sinatra inspired web framework</a:t>
             </a:r>
           </a:p>
           <a:p>
@@ -18817,11 +18875,7 @@
           <a:p>
             <a:r>
               <a:rPr lang="en-US" dirty="0" smtClean="0"/>
-              <a:t>Useful </a:t>
-            </a:r>
-            <a:r>
-              <a:rPr lang="en-US" dirty="0" smtClean="0"/>
-              <a:t>for </a:t>
+              <a:t>Useful for </a:t>
             </a:r>
             <a:r>
               <a:rPr lang="en-US" dirty="0" err="1" smtClean="0"/>
@@ -19774,13 +19828,8 @@
           <a:p>
             <a:r>
               <a:rPr lang="en-US" dirty="0" smtClean="0"/>
-              <a:t>Minimalistic code</a:t>
-            </a:r>
-            <a:r>
-              <a:rPr lang="en-US" dirty="0" smtClean="0"/>
-              <a:t>.</a:t>
-            </a:r>
-            <a:endParaRPr lang="en-US" dirty="0" smtClean="0"/>
+              <a:t>Minimalistic code.</a:t>
+            </a:r>
           </a:p>
           <a:p>
             <a:endParaRPr lang="en-US" dirty="0"/>
@@ -19909,11 +19958,7 @@
             </a:r>
             <a:r>
               <a:rPr lang="en-US" dirty="0" smtClean="0"/>
-              <a:t> </a:t>
-            </a:r>
-            <a:r>
-              <a:rPr lang="en-US" dirty="0" smtClean="0"/>
-              <a:t>provides an abstraction over </a:t>
+              <a:t> provides an abstraction over </a:t>
             </a:r>
             <a:r>
               <a:rPr lang="en-US" dirty="0" err="1" smtClean="0"/>
@@ -19921,11 +19966,7 @@
             </a:r>
             <a:r>
               <a:rPr lang="en-US" dirty="0" smtClean="0"/>
-              <a:t> that </a:t>
-            </a:r>
-            <a:r>
-              <a:rPr lang="en-US" dirty="0" smtClean="0"/>
-              <a:t>cleans up a lot of </a:t>
+              <a:t> that cleans up a lot of </a:t>
             </a:r>
             <a:r>
               <a:rPr lang="en-US" dirty="0" err="1" smtClean="0"/>

</xml_diff>